<commit_message>
Audio IPYNB Edit and PPT Edit
</commit_message>
<xml_diff>
--- a/WaveletAnalysis.pptx
+++ b/WaveletAnalysis.pptx
@@ -111,6 +111,11 @@
       </a:defRPr>
     </a:lvl9pPr>
   </p:defaultTextStyle>
+  <p:extLst>
+    <p:ext uri="{EFAFB233-063F-42B5-8137-9DF3F51BA10A}">
+      <p15:sldGuideLst xmlns:p15="http://schemas.microsoft.com/office/powerpoint/2012/main"/>
+    </p:ext>
+  </p:extLst>
 </p:presentation>
 </file>
 
@@ -3874,91 +3879,122 @@
           <a:chExt cx="0" cy="0"/>
         </a:xfrm>
       </p:grpSpPr>
-      <p:pic>
-        <p:nvPicPr>
-          <p:cNvPr id="4" name="Google Shape;84;p1">
-            <a:extLst>
-              <a:ext uri="{FF2B5EF4-FFF2-40B4-BE49-F238E27FC236}">
-                <a16:creationId xmlns:a16="http://schemas.microsoft.com/office/drawing/2014/main" id="{4ED8663B-DEC8-A033-3C15-5B4C5AA87BB4}"/>
-              </a:ext>
-            </a:extLst>
-          </p:cNvPr>
-          <p:cNvPicPr preferRelativeResize="0"/>
+      <p:grpSp>
+        <p:nvGrpSpPr>
+          <p:cNvPr id="6" name="Group 5">
+            <a:extLst>
+              <a:ext uri="{FF2B5EF4-FFF2-40B4-BE49-F238E27FC236}">
+                <a16:creationId xmlns:a16="http://schemas.microsoft.com/office/drawing/2014/main" id="{A398CB2D-DEA1-3470-550F-7565940FEF5A}"/>
+              </a:ext>
+            </a:extLst>
+          </p:cNvPr>
+          <p:cNvGrpSpPr/>
           <p:nvPr/>
-        </p:nvPicPr>
-        <p:blipFill>
-          <a:blip r:embed="rId2">
-            <a:alphaModFix/>
-          </a:blip>
-          <a:stretch>
-            <a:fillRect/>
-          </a:stretch>
-        </p:blipFill>
-        <p:spPr>
+        </p:nvGrpSpPr>
+        <p:grpSpPr>
           <a:xfrm>
-            <a:off x="0" y="0"/>
+            <a:off x="-78658" y="0"/>
             <a:ext cx="12270658" cy="6858000"/>
+            <a:chOff x="0" y="0"/>
+            <a:chExt cx="12270658" cy="6858000"/>
           </a:xfrm>
-          <a:prstGeom prst="rect">
-            <a:avLst/>
-          </a:prstGeom>
-          <a:noFill/>
-          <a:ln>
+        </p:grpSpPr>
+        <p:pic>
+          <p:nvPicPr>
+            <p:cNvPr id="4" name="Google Shape;84;p1">
+              <a:extLst>
+                <a:ext uri="{FF2B5EF4-FFF2-40B4-BE49-F238E27FC236}">
+                  <a16:creationId xmlns:a16="http://schemas.microsoft.com/office/drawing/2014/main" id="{4ED8663B-DEC8-A033-3C15-5B4C5AA87BB4}"/>
+                </a:ext>
+              </a:extLst>
+            </p:cNvPr>
+            <p:cNvPicPr preferRelativeResize="0"/>
+            <p:nvPr/>
+          </p:nvPicPr>
+          <p:blipFill>
+            <a:blip r:embed="rId2">
+              <a:alphaModFix/>
+            </a:blip>
+            <a:stretch>
+              <a:fillRect/>
+            </a:stretch>
+          </p:blipFill>
+          <p:spPr>
+            <a:xfrm>
+              <a:off x="0" y="0"/>
+              <a:ext cx="12270658" cy="6858000"/>
+            </a:xfrm>
+            <a:prstGeom prst="rect">
+              <a:avLst/>
+            </a:prstGeom>
             <a:noFill/>
-          </a:ln>
-        </p:spPr>
-      </p:pic>
-      <p:sp>
-        <p:nvSpPr>
-          <p:cNvPr id="5" name="Google Shape;85;p1">
-            <a:extLst>
-              <a:ext uri="{FF2B5EF4-FFF2-40B4-BE49-F238E27FC236}">
-                <a16:creationId xmlns:a16="http://schemas.microsoft.com/office/drawing/2014/main" id="{F8EA436E-E4E2-0E32-1520-3BF5871AEC4A}"/>
-              </a:ext>
-            </a:extLst>
-          </p:cNvPr>
-          <p:cNvSpPr txBox="1"/>
-          <p:nvPr/>
-        </p:nvSpPr>
-        <p:spPr>
-          <a:xfrm>
-            <a:off x="7027182" y="5341480"/>
-            <a:ext cx="4524600" cy="796800"/>
-          </a:xfrm>
-          <a:prstGeom prst="rect">
-            <a:avLst/>
-          </a:prstGeom>
-          <a:solidFill>
-            <a:srgbClr val="E1BC8A"/>
-          </a:solidFill>
-          <a:ln>
-            <a:noFill/>
-          </a:ln>
-          <a:effectLst>
-            <a:outerShdw blurRad="57150" dist="19050" dir="5400000" algn="bl" rotWithShape="0">
-              <a:schemeClr val="dk1">
-                <a:alpha val="50000"/>
-              </a:schemeClr>
-            </a:outerShdw>
-          </a:effectLst>
-        </p:spPr>
-        <p:txBody>
-          <a:bodyPr spcFirstLastPara="1" wrap="square" lIns="91425" tIns="91425" rIns="91425" bIns="91425" anchor="t" anchorCtr="0">
-            <a:noAutofit/>
-          </a:bodyPr>
-          <a:lstStyle/>
-          <a:p>
-            <a:pPr marL="0" lvl="0" indent="0" algn="ctr" rtl="0">
-              <a:spcBef>
-                <a:spcPts val="0"/>
-              </a:spcBef>
-              <a:spcAft>
-                <a:spcPts val="0"/>
-              </a:spcAft>
-              <a:buNone/>
-            </a:pPr>
-            <a:r>
-              <a:rPr lang="en-US" sz="4200" b="1" dirty="0">
+            <a:ln>
+              <a:noFill/>
+            </a:ln>
+          </p:spPr>
+        </p:pic>
+        <p:sp>
+          <p:nvSpPr>
+            <p:cNvPr id="5" name="Google Shape;85;p1">
+              <a:extLst>
+                <a:ext uri="{FF2B5EF4-FFF2-40B4-BE49-F238E27FC236}">
+                  <a16:creationId xmlns:a16="http://schemas.microsoft.com/office/drawing/2014/main" id="{F8EA436E-E4E2-0E32-1520-3BF5871AEC4A}"/>
+                </a:ext>
+              </a:extLst>
+            </p:cNvPr>
+            <p:cNvSpPr txBox="1"/>
+            <p:nvPr/>
+          </p:nvSpPr>
+          <p:spPr>
+            <a:xfrm>
+              <a:off x="7027182" y="5341480"/>
+              <a:ext cx="4524600" cy="796800"/>
+            </a:xfrm>
+            <a:prstGeom prst="rect">
+              <a:avLst/>
+            </a:prstGeom>
+            <a:solidFill>
+              <a:srgbClr val="E1BC8A"/>
+            </a:solidFill>
+            <a:ln>
+              <a:noFill/>
+            </a:ln>
+            <a:effectLst>
+              <a:outerShdw blurRad="57150" dist="19050" dir="5400000" algn="bl" rotWithShape="0">
+                <a:schemeClr val="dk1">
+                  <a:alpha val="50000"/>
+                </a:schemeClr>
+              </a:outerShdw>
+            </a:effectLst>
+          </p:spPr>
+          <p:txBody>
+            <a:bodyPr spcFirstLastPara="1" wrap="square" lIns="91425" tIns="91425" rIns="91425" bIns="91425" anchor="t" anchorCtr="0">
+              <a:noAutofit/>
+            </a:bodyPr>
+            <a:lstStyle/>
+            <a:p>
+              <a:pPr marL="0" lvl="0" indent="0" algn="ctr" rtl="0">
+                <a:spcBef>
+                  <a:spcPts val="0"/>
+                </a:spcBef>
+                <a:spcAft>
+                  <a:spcPts val="0"/>
+                </a:spcAft>
+                <a:buNone/>
+              </a:pPr>
+              <a:r>
+                <a:rPr lang="en-US" sz="4200" b="1" dirty="0">
+                  <a:solidFill>
+                    <a:schemeClr val="dk1"/>
+                  </a:solidFill>
+                  <a:latin typeface="Calibri"/>
+                  <a:ea typeface="Calibri"/>
+                  <a:cs typeface="Calibri"/>
+                  <a:sym typeface="Calibri"/>
+                </a:rPr>
+                <a:t>WAVELET ANALYSIS</a:t>
+              </a:r>
+              <a:endParaRPr sz="4200" b="1" dirty="0">
                 <a:solidFill>
                   <a:schemeClr val="dk1"/>
                 </a:solidFill>
@@ -3966,21 +4002,11 @@
                 <a:ea typeface="Calibri"/>
                 <a:cs typeface="Calibri"/>
                 <a:sym typeface="Calibri"/>
-              </a:rPr>
-              <a:t>WAVELET ANALYSIS</a:t>
-            </a:r>
-            <a:endParaRPr sz="4200" b="1" dirty="0">
-              <a:solidFill>
-                <a:schemeClr val="dk1"/>
-              </a:solidFill>
-              <a:latin typeface="Calibri"/>
-              <a:ea typeface="Calibri"/>
-              <a:cs typeface="Calibri"/>
-              <a:sym typeface="Calibri"/>
-            </a:endParaRPr>
-          </a:p>
-        </p:txBody>
-      </p:sp>
+              </a:endParaRPr>
+            </a:p>
+          </p:txBody>
+        </p:sp>
+      </p:grpSp>
     </p:spTree>
     <p:extLst>
       <p:ext uri="{BB962C8B-B14F-4D97-AF65-F5344CB8AC3E}">
@@ -4488,6 +4514,12 @@
 <file path=ppt/slides/slide4.xml><?xml version="1.0" encoding="utf-8"?>
 <p:sld xmlns:a="http://schemas.openxmlformats.org/drawingml/2006/main" xmlns:r="http://schemas.openxmlformats.org/officeDocument/2006/relationships" xmlns:p="http://schemas.openxmlformats.org/presentationml/2006/main">
   <p:cSld>
+    <p:bg>
+      <p:bgPr>
+        <a:noFill/>
+        <a:effectLst/>
+      </p:bgPr>
+    </p:bg>
     <p:spTree>
       <p:nvGrpSpPr>
         <p:cNvPr id="1" name=""/>
@@ -4538,58 +4570,445 @@
           </a:p>
         </p:txBody>
       </p:sp>
-      <p:sp>
-        <p:nvSpPr>
-          <p:cNvPr id="3" name="Content Placeholder 2">
-            <a:extLst>
-              <a:ext uri="{FF2B5EF4-FFF2-40B4-BE49-F238E27FC236}">
-                <a16:creationId xmlns:a16="http://schemas.microsoft.com/office/drawing/2014/main" id="{4D7AEBB3-55EA-C6E3-884E-48959C42C5A4}"/>
-              </a:ext>
-            </a:extLst>
-          </p:cNvPr>
-          <p:cNvSpPr>
-            <a:spLocks noGrp="1"/>
-          </p:cNvSpPr>
-          <p:nvPr>
-            <p:ph idx="1"/>
-          </p:nvPr>
+      <mc:AlternateContent xmlns:mc="http://schemas.openxmlformats.org/markup-compatibility/2006">
+        <mc:Choice xmlns:a14="http://schemas.microsoft.com/office/drawing/2010/main" Requires="a14">
+          <p:sp>
+            <p:nvSpPr>
+              <p:cNvPr id="3" name="Content Placeholder 2">
+                <a:extLst>
+                  <a:ext uri="{FF2B5EF4-FFF2-40B4-BE49-F238E27FC236}">
+                    <a16:creationId xmlns:a16="http://schemas.microsoft.com/office/drawing/2014/main" id="{4D7AEBB3-55EA-C6E3-884E-48959C42C5A4}"/>
+                  </a:ext>
+                </a:extLst>
+              </p:cNvPr>
+              <p:cNvSpPr>
+                <a:spLocks noGrp="1"/>
+              </p:cNvSpPr>
+              <p:nvPr>
+                <p:ph idx="1"/>
+              </p:nvPr>
+            </p:nvSpPr>
+            <p:spPr>
+              <a:xfrm>
+                <a:off x="838200" y="1184988"/>
+                <a:ext cx="10515600" cy="4991975"/>
+              </a:xfrm>
+            </p:spPr>
+            <p:txBody>
+              <a:bodyPr>
+                <a:normAutofit lnSpcReduction="10000"/>
+              </a:bodyPr>
+              <a:lstStyle/>
+              <a:p>
+                <a:pPr marL="0" indent="0">
+                  <a:buNone/>
+                </a:pPr>
+                <a:r>
+                  <a:rPr lang="en-US" dirty="0"/>
+                  <a:t>It is basically measure the amount of similarity between a wavelet with another continuous/discrete wave. (Inner Product)</a:t>
+                </a:r>
+              </a:p>
+              <a:p>
+                <a:r>
+                  <a:rPr lang="en-US" dirty="0"/>
+                  <a:t>Integral Wavelet Transform is given by</a:t>
+                </a:r>
+              </a:p>
+              <a:p>
+                <a:pPr marL="0" indent="0">
+                  <a:buNone/>
+                </a:pPr>
+                <a14:m>
+                  <m:oMathPara xmlns:m="http://schemas.openxmlformats.org/officeDocument/2006/math">
+                    <m:oMathParaPr>
+                      <m:jc m:val="centerGroup"/>
+                    </m:oMathParaPr>
+                    <m:oMath xmlns:m="http://schemas.openxmlformats.org/officeDocument/2006/math">
+                      <m:sSub>
+                        <m:sSubPr>
+                          <m:ctrlPr>
+                            <a:rPr lang="en-US" i="1" smtClean="0">
+                              <a:latin typeface="Cambria Math" panose="02040503050406030204" pitchFamily="18" charset="0"/>
+                            </a:rPr>
+                          </m:ctrlPr>
+                        </m:sSubPr>
+                        <m:e>
+                          <m:r>
+                            <a:rPr lang="en-US" b="0" i="1" smtClean="0">
+                              <a:latin typeface="Cambria Math" panose="02040503050406030204" pitchFamily="18" charset="0"/>
+                            </a:rPr>
+                            <m:t>[</m:t>
+                          </m:r>
+                          <m:r>
+                            <a:rPr lang="en-US" b="0" i="1" smtClean="0">
+                              <a:latin typeface="Cambria Math" panose="02040503050406030204" pitchFamily="18" charset="0"/>
+                            </a:rPr>
+                            <m:t>𝑊</m:t>
+                          </m:r>
+                        </m:e>
+                        <m:sub>
+                          <m:r>
+                            <a:rPr lang="en-US" i="1" smtClean="0">
+                              <a:latin typeface="Cambria Math" panose="02040503050406030204" pitchFamily="18" charset="0"/>
+                              <a:ea typeface="Cambria Math" panose="02040503050406030204" pitchFamily="18" charset="0"/>
+                            </a:rPr>
+                            <m:t>𝜓</m:t>
+                          </m:r>
+                        </m:sub>
+                      </m:sSub>
+                      <m:r>
+                        <a:rPr lang="en-US" b="0" i="1" smtClean="0">
+                          <a:latin typeface="Cambria Math" panose="02040503050406030204" pitchFamily="18" charset="0"/>
+                        </a:rPr>
+                        <m:t>]</m:t>
+                      </m:r>
+                      <m:d>
+                        <m:dPr>
+                          <m:ctrlPr>
+                            <a:rPr lang="en-US" b="0" i="1" smtClean="0">
+                              <a:latin typeface="Cambria Math" panose="02040503050406030204" pitchFamily="18" charset="0"/>
+                            </a:rPr>
+                          </m:ctrlPr>
+                        </m:dPr>
+                        <m:e>
+                          <m:r>
+                            <a:rPr lang="en-US" b="0" i="1" smtClean="0">
+                              <a:latin typeface="Cambria Math" panose="02040503050406030204" pitchFamily="18" charset="0"/>
+                            </a:rPr>
+                            <m:t>𝑎</m:t>
+                          </m:r>
+                          <m:r>
+                            <a:rPr lang="en-US" b="0" i="1" smtClean="0">
+                              <a:latin typeface="Cambria Math" panose="02040503050406030204" pitchFamily="18" charset="0"/>
+                            </a:rPr>
+                            <m:t>,</m:t>
+                          </m:r>
+                          <m:r>
+                            <a:rPr lang="en-US" b="0" i="1" smtClean="0">
+                              <a:latin typeface="Cambria Math" panose="02040503050406030204" pitchFamily="18" charset="0"/>
+                            </a:rPr>
+                            <m:t>𝑏</m:t>
+                          </m:r>
+                        </m:e>
+                      </m:d>
+                      <m:r>
+                        <a:rPr lang="en-US" b="0" i="1" smtClean="0">
+                          <a:latin typeface="Cambria Math" panose="02040503050406030204" pitchFamily="18" charset="0"/>
+                        </a:rPr>
+                        <m:t>=</m:t>
+                      </m:r>
+                      <m:f>
+                        <m:fPr>
+                          <m:ctrlPr>
+                            <a:rPr lang="en-US" b="0" i="1" smtClean="0">
+                              <a:latin typeface="Cambria Math" panose="02040503050406030204" pitchFamily="18" charset="0"/>
+                            </a:rPr>
+                          </m:ctrlPr>
+                        </m:fPr>
+                        <m:num>
+                          <m:r>
+                            <a:rPr lang="en-US" b="0" i="1" smtClean="0">
+                              <a:latin typeface="Cambria Math" panose="02040503050406030204" pitchFamily="18" charset="0"/>
+                            </a:rPr>
+                            <m:t>1</m:t>
+                          </m:r>
+                        </m:num>
+                        <m:den>
+                          <m:rad>
+                            <m:radPr>
+                              <m:degHide m:val="on"/>
+                              <m:ctrlPr>
+                                <a:rPr lang="en-US" b="0" i="1" smtClean="0">
+                                  <a:latin typeface="Cambria Math" panose="02040503050406030204" pitchFamily="18" charset="0"/>
+                                  <a:ea typeface="Cambria Math" panose="02040503050406030204" pitchFamily="18" charset="0"/>
+                                </a:rPr>
+                              </m:ctrlPr>
+                            </m:radPr>
+                            <m:deg/>
+                            <m:e>
+                              <m:r>
+                                <a:rPr lang="en-US" b="0" i="1" smtClean="0">
+                                  <a:latin typeface="Cambria Math" panose="02040503050406030204" pitchFamily="18" charset="0"/>
+                                  <a:ea typeface="Cambria Math" panose="02040503050406030204" pitchFamily="18" charset="0"/>
+                                </a:rPr>
+                                <m:t>𝑎</m:t>
+                              </m:r>
+                            </m:e>
+                          </m:rad>
+                        </m:den>
+                      </m:f>
+                      <m:nary>
+                        <m:naryPr>
+                          <m:limLoc m:val="undOvr"/>
+                          <m:ctrlPr>
+                            <a:rPr lang="en-US" b="0" i="1" smtClean="0">
+                              <a:latin typeface="Cambria Math" panose="02040503050406030204" pitchFamily="18" charset="0"/>
+                            </a:rPr>
+                          </m:ctrlPr>
+                        </m:naryPr>
+                        <m:sub>
+                          <m:r>
+                            <m:rPr>
+                              <m:brk m:alnAt="24"/>
+                            </m:rPr>
+                            <a:rPr lang="en-US" b="0" i="1" smtClean="0">
+                              <a:latin typeface="Cambria Math" panose="02040503050406030204" pitchFamily="18" charset="0"/>
+                            </a:rPr>
+                            <m:t>−</m:t>
+                          </m:r>
+                          <m:r>
+                            <a:rPr lang="en-US" b="0" i="1" smtClean="0">
+                              <a:latin typeface="Cambria Math" panose="02040503050406030204" pitchFamily="18" charset="0"/>
+                              <a:ea typeface="Cambria Math" panose="02040503050406030204" pitchFamily="18" charset="0"/>
+                            </a:rPr>
+                            <m:t>∞</m:t>
+                          </m:r>
+                        </m:sub>
+                        <m:sup>
+                          <m:r>
+                            <a:rPr lang="en-US" b="0" i="1" smtClean="0">
+                              <a:latin typeface="Cambria Math" panose="02040503050406030204" pitchFamily="18" charset="0"/>
+                              <a:ea typeface="Cambria Math" panose="02040503050406030204" pitchFamily="18" charset="0"/>
+                            </a:rPr>
+                            <m:t>∞</m:t>
+                          </m:r>
+                        </m:sup>
+                        <m:e>
+                          <m:acc>
+                            <m:accPr>
+                              <m:chr m:val="̅"/>
+                              <m:ctrlPr>
+                                <a:rPr lang="en-US" b="0" i="1" smtClean="0">
+                                  <a:latin typeface="Cambria Math" panose="02040503050406030204" pitchFamily="18" charset="0"/>
+                                  <a:ea typeface="Cambria Math" panose="02040503050406030204" pitchFamily="18" charset="0"/>
+                                </a:rPr>
+                              </m:ctrlPr>
+                            </m:accPr>
+                            <m:e>
+                              <m:r>
+                                <a:rPr lang="en-US" i="1">
+                                  <a:latin typeface="Cambria Math" panose="02040503050406030204" pitchFamily="18" charset="0"/>
+                                  <a:ea typeface="Cambria Math" panose="02040503050406030204" pitchFamily="18" charset="0"/>
+                                </a:rPr>
+                                <m:t>𝜓</m:t>
+                              </m:r>
+                              <m:d>
+                                <m:dPr>
+                                  <m:ctrlPr>
+                                    <a:rPr lang="en-US" i="1">
+                                      <a:latin typeface="Cambria Math" panose="02040503050406030204" pitchFamily="18" charset="0"/>
+                                      <a:ea typeface="Cambria Math" panose="02040503050406030204" pitchFamily="18" charset="0"/>
+                                    </a:rPr>
+                                  </m:ctrlPr>
+                                </m:dPr>
+                                <m:e>
+                                  <m:f>
+                                    <m:fPr>
+                                      <m:ctrlPr>
+                                        <a:rPr lang="en-US" i="1">
+                                          <a:latin typeface="Cambria Math" panose="02040503050406030204" pitchFamily="18" charset="0"/>
+                                          <a:ea typeface="Cambria Math" panose="02040503050406030204" pitchFamily="18" charset="0"/>
+                                        </a:rPr>
+                                      </m:ctrlPr>
+                                    </m:fPr>
+                                    <m:num>
+                                      <m:r>
+                                        <a:rPr lang="en-US" i="1">
+                                          <a:latin typeface="Cambria Math" panose="02040503050406030204" pitchFamily="18" charset="0"/>
+                                          <a:ea typeface="Cambria Math" panose="02040503050406030204" pitchFamily="18" charset="0"/>
+                                        </a:rPr>
+                                        <m:t>𝑥</m:t>
+                                      </m:r>
+                                      <m:r>
+                                        <a:rPr lang="en-US" i="1">
+                                          <a:latin typeface="Cambria Math" panose="02040503050406030204" pitchFamily="18" charset="0"/>
+                                          <a:ea typeface="Cambria Math" panose="02040503050406030204" pitchFamily="18" charset="0"/>
+                                        </a:rPr>
+                                        <m:t>−</m:t>
+                                      </m:r>
+                                      <m:r>
+                                        <a:rPr lang="en-US" i="1">
+                                          <a:latin typeface="Cambria Math" panose="02040503050406030204" pitchFamily="18" charset="0"/>
+                                          <a:ea typeface="Cambria Math" panose="02040503050406030204" pitchFamily="18" charset="0"/>
+                                        </a:rPr>
+                                        <m:t>𝑏</m:t>
+                                      </m:r>
+                                    </m:num>
+                                    <m:den>
+                                      <m:r>
+                                        <a:rPr lang="en-US" i="1">
+                                          <a:latin typeface="Cambria Math" panose="02040503050406030204" pitchFamily="18" charset="0"/>
+                                          <a:ea typeface="Cambria Math" panose="02040503050406030204" pitchFamily="18" charset="0"/>
+                                        </a:rPr>
+                                        <m:t>𝑎</m:t>
+                                      </m:r>
+                                    </m:den>
+                                  </m:f>
+                                </m:e>
+                              </m:d>
+                            </m:e>
+                          </m:acc>
+                        </m:e>
+                      </m:nary>
+                      <m:r>
+                        <a:rPr lang="en-US" b="0" i="1" smtClean="0">
+                          <a:latin typeface="Cambria Math" panose="02040503050406030204" pitchFamily="18" charset="0"/>
+                        </a:rPr>
+                        <m:t> </m:t>
+                      </m:r>
+                      <m:r>
+                        <a:rPr lang="en-US" b="0" i="1" smtClean="0">
+                          <a:latin typeface="Cambria Math" panose="02040503050406030204" pitchFamily="18" charset="0"/>
+                        </a:rPr>
+                        <m:t>𝑓</m:t>
+                      </m:r>
+                      <m:d>
+                        <m:dPr>
+                          <m:ctrlPr>
+                            <a:rPr lang="en-US" b="0" i="1" smtClean="0">
+                              <a:latin typeface="Cambria Math" panose="02040503050406030204" pitchFamily="18" charset="0"/>
+                            </a:rPr>
+                          </m:ctrlPr>
+                        </m:dPr>
+                        <m:e>
+                          <m:r>
+                            <a:rPr lang="en-US" b="0" i="1" smtClean="0">
+                              <a:latin typeface="Cambria Math" panose="02040503050406030204" pitchFamily="18" charset="0"/>
+                            </a:rPr>
+                            <m:t>𝑥</m:t>
+                          </m:r>
+                        </m:e>
+                      </m:d>
+                      <m:r>
+                        <a:rPr lang="en-US" b="0" i="1" smtClean="0">
+                          <a:latin typeface="Cambria Math" panose="02040503050406030204" pitchFamily="18" charset="0"/>
+                        </a:rPr>
+                        <m:t> </m:t>
+                      </m:r>
+                      <m:r>
+                        <a:rPr lang="en-US" b="0" i="1" smtClean="0">
+                          <a:latin typeface="Cambria Math" panose="02040503050406030204" pitchFamily="18" charset="0"/>
+                        </a:rPr>
+                        <m:t>𝑑𝑥</m:t>
+                      </m:r>
+                    </m:oMath>
+                  </m:oMathPara>
+                </a14:m>
+                <a:endParaRPr lang="en-US" dirty="0"/>
+              </a:p>
+              <a:p>
+                <a:pPr marL="0" indent="0">
+                  <a:buNone/>
+                </a:pPr>
+                <a:r>
+                  <a:rPr lang="en-US" dirty="0"/>
+                  <a:t>The coefficients a and b refers to</a:t>
+                </a:r>
+              </a:p>
+              <a:p>
+                <a:pPr marL="0" indent="0">
+                  <a:buNone/>
+                </a:pPr>
+                <a:r>
+                  <a:rPr lang="en-US" dirty="0"/>
+                  <a:t>	a = dyadic/binary dilation</a:t>
+                </a:r>
+              </a:p>
+              <a:p>
+                <a:pPr marL="0" indent="0">
+                  <a:buNone/>
+                </a:pPr>
+                <a:r>
+                  <a:rPr lang="en-US" dirty="0"/>
+                  <a:t>	b = binary/dyadic position</a:t>
+                </a:r>
+              </a:p>
+              <a:p>
+                <a:pPr marL="0" indent="0">
+                  <a:buNone/>
+                </a:pPr>
+                <a:r>
+                  <a:rPr lang="en-US" dirty="0"/>
+                  <a:t>		where, a – corresponds to dilation and</a:t>
+                </a:r>
+              </a:p>
+              <a:p>
+                <a:pPr marL="0" indent="0">
+                  <a:buNone/>
+                </a:pPr>
+                <a:r>
+                  <a:rPr lang="en-US" dirty="0"/>
+                  <a:t>			  b – corresponds to translation	</a:t>
+                </a:r>
+              </a:p>
+              <a:p>
+                <a:pPr marL="0" indent="0">
+                  <a:buNone/>
+                </a:pPr>
+                <a:endParaRPr lang="en-IN" dirty="0"/>
+              </a:p>
+            </p:txBody>
+          </p:sp>
+        </mc:Choice>
+        <mc:Fallback>
+          <p:sp>
+            <p:nvSpPr>
+              <p:cNvPr id="3" name="Content Placeholder 2">
+                <a:extLst>
+                  <a:ext uri="{FF2B5EF4-FFF2-40B4-BE49-F238E27FC236}">
+                    <a16:creationId xmlns:a16="http://schemas.microsoft.com/office/drawing/2014/main" id="{4D7AEBB3-55EA-C6E3-884E-48959C42C5A4}"/>
+                  </a:ext>
+                </a:extLst>
+              </p:cNvPr>
+              <p:cNvSpPr>
+                <a:spLocks noGrp="1" noRot="1" noChangeAspect="1" noMove="1" noResize="1" noEditPoints="1" noAdjustHandles="1" noChangeArrowheads="1" noChangeShapeType="1" noTextEdit="1"/>
+              </p:cNvSpPr>
+              <p:nvPr>
+                <p:ph idx="1"/>
+              </p:nvPr>
+            </p:nvSpPr>
+            <p:spPr>
+              <a:xfrm>
+                <a:off x="838200" y="1184988"/>
+                <a:ext cx="10515600" cy="4991975"/>
+              </a:xfrm>
+              <a:blipFill>
+                <a:blip r:embed="rId2"/>
+                <a:stretch>
+                  <a:fillRect l="-1217" t="-2686" r="-870"/>
+                </a:stretch>
+              </a:blipFill>
+            </p:spPr>
+            <p:txBody>
+              <a:bodyPr/>
+              <a:lstStyle/>
+              <a:p>
+                <a:r>
+                  <a:rPr lang="en-IN">
+                    <a:noFill/>
+                  </a:rPr>
+                  <a:t> </a:t>
+                </a:r>
+              </a:p>
+            </p:txBody>
+          </p:sp>
+        </mc:Fallback>
+      </mc:AlternateContent>
+      <p:sp>
+        <p:nvSpPr>
+          <p:cNvPr id="4" name="TextBox 3">
+            <a:extLst>
+              <a:ext uri="{FF2B5EF4-FFF2-40B4-BE49-F238E27FC236}">
+                <a16:creationId xmlns:a16="http://schemas.microsoft.com/office/drawing/2014/main" id="{1D75320C-F14B-1150-8520-F1B3E7A90696}"/>
+              </a:ext>
+            </a:extLst>
+          </p:cNvPr>
+          <p:cNvSpPr txBox="1"/>
+          <p:nvPr/>
         </p:nvSpPr>
         <p:spPr>
           <a:xfrm>
-            <a:off x="838200" y="1184988"/>
-            <a:ext cx="10515600" cy="4991975"/>
-          </a:xfrm>
-        </p:spPr>
-        <p:txBody>
-          <a:bodyPr/>
-          <a:lstStyle/>
-          <a:p>
-            <a:pPr marL="0" indent="0">
-              <a:buNone/>
-            </a:pPr>
-            <a:r>
-              <a:rPr lang="en-US" dirty="0"/>
-              <a:t>It basically measure the amount of similarity between the mother</a:t>
-            </a:r>
-            <a:endParaRPr lang="en-IN" dirty="0"/>
-          </a:p>
-        </p:txBody>
-      </p:sp>
-      <p:sp>
-        <p:nvSpPr>
-          <p:cNvPr id="4" name="TextBox 3">
-            <a:extLst>
-              <a:ext uri="{FF2B5EF4-FFF2-40B4-BE49-F238E27FC236}">
-                <a16:creationId xmlns:a16="http://schemas.microsoft.com/office/drawing/2014/main" id="{1D75320C-F14B-1150-8520-F1B3E7A90696}"/>
-              </a:ext>
-            </a:extLst>
-          </p:cNvPr>
-          <p:cNvSpPr txBox="1"/>
-          <p:nvPr/>
-        </p:nvSpPr>
-        <p:spPr>
-          <a:xfrm>
-            <a:off x="10599174" y="365125"/>
+            <a:off x="10461522" y="496371"/>
             <a:ext cx="1333507" cy="369332"/>
           </a:xfrm>
           <a:prstGeom prst="rect">
@@ -4608,6 +5027,51 @@
               <a:t>Continued…</a:t>
             </a:r>
             <a:endParaRPr lang="en-IN" dirty="0"/>
+          </a:p>
+        </p:txBody>
+      </p:sp>
+      <p:sp>
+        <p:nvSpPr>
+          <p:cNvPr id="6" name="AutoShape 3" descr="\left[W_\psi f\right](a, b) = \frac{1}{\sqrt{|a|}} \int_{-\infty}^\infty \overline{\psi\left(\frac{x-b}{a}\right)}f(x)dx\,">
+            <a:extLst>
+              <a:ext uri="{FF2B5EF4-FFF2-40B4-BE49-F238E27FC236}">
+                <a16:creationId xmlns:a16="http://schemas.microsoft.com/office/drawing/2014/main" id="{73FA8B8E-5E1A-51E2-CCF3-EE3AF5385EB3}"/>
+              </a:ext>
+            </a:extLst>
+          </p:cNvPr>
+          <p:cNvSpPr>
+            <a:spLocks noChangeAspect="1" noChangeArrowheads="1"/>
+          </p:cNvSpPr>
+          <p:nvPr/>
+        </p:nvSpPr>
+        <p:spPr bwMode="auto">
+          <a:xfrm>
+            <a:off x="196850" y="-198438"/>
+            <a:ext cx="304800" cy="304801"/>
+          </a:xfrm>
+          <a:prstGeom prst="rect">
+            <a:avLst/>
+          </a:prstGeom>
+          <a:noFill/>
+          <a:extLst>
+            <a:ext uri="{909E8E84-426E-40DD-AFC4-6F175D3DCCD1}">
+              <a14:hiddenFill xmlns:a14="http://schemas.microsoft.com/office/drawing/2010/main">
+                <a:solidFill>
+                  <a:srgbClr val="FFFFFF"/>
+                </a:solidFill>
+              </a14:hiddenFill>
+            </a:ext>
+          </a:extLst>
+        </p:spPr>
+        <p:txBody>
+          <a:bodyPr vert="horz" wrap="square" lIns="91440" tIns="45720" rIns="91440" bIns="45720" numCol="1" anchor="t" anchorCtr="0" compatLnSpc="1">
+            <a:prstTxWarp prst="textNoShape">
+              <a:avLst/>
+            </a:prstTxWarp>
+          </a:bodyPr>
+          <a:lstStyle/>
+          <a:p>
+            <a:endParaRPr lang="en-IN"/>
           </a:p>
         </p:txBody>
       </p:sp>

</xml_diff>